<commit_message>
updated image logic architecture project side
</commit_message>
<xml_diff>
--- a/Sprint2_ISS2020/userDocs/imagesELI.pptx
+++ b/Sprint2_ISS2020/userDocs/imagesELI.pptx
@@ -268,7 +268,7 @@
           <a:p>
             <a:fld id="{E4248CD4-4C32-45E7-9F40-9E5F0D1EAF13}" type="datetimeFigureOut">
               <a:rPr lang="it-IT" smtClean="0"/>
-              <a:t>30/09/2020</a:t>
+              <a:t>01/10/2020</a:t>
             </a:fld>
             <a:endParaRPr lang="it-IT"/>
           </a:p>
@@ -466,7 +466,7 @@
           <a:p>
             <a:fld id="{E4248CD4-4C32-45E7-9F40-9E5F0D1EAF13}" type="datetimeFigureOut">
               <a:rPr lang="it-IT" smtClean="0"/>
-              <a:t>30/09/2020</a:t>
+              <a:t>01/10/2020</a:t>
             </a:fld>
             <a:endParaRPr lang="it-IT"/>
           </a:p>
@@ -674,7 +674,7 @@
           <a:p>
             <a:fld id="{E4248CD4-4C32-45E7-9F40-9E5F0D1EAF13}" type="datetimeFigureOut">
               <a:rPr lang="it-IT" smtClean="0"/>
-              <a:t>30/09/2020</a:t>
+              <a:t>01/10/2020</a:t>
             </a:fld>
             <a:endParaRPr lang="it-IT"/>
           </a:p>
@@ -872,7 +872,7 @@
           <a:p>
             <a:fld id="{E4248CD4-4C32-45E7-9F40-9E5F0D1EAF13}" type="datetimeFigureOut">
               <a:rPr lang="it-IT" smtClean="0"/>
-              <a:t>30/09/2020</a:t>
+              <a:t>01/10/2020</a:t>
             </a:fld>
             <a:endParaRPr lang="it-IT"/>
           </a:p>
@@ -1147,7 +1147,7 @@
           <a:p>
             <a:fld id="{E4248CD4-4C32-45E7-9F40-9E5F0D1EAF13}" type="datetimeFigureOut">
               <a:rPr lang="it-IT" smtClean="0"/>
-              <a:t>30/09/2020</a:t>
+              <a:t>01/10/2020</a:t>
             </a:fld>
             <a:endParaRPr lang="it-IT"/>
           </a:p>
@@ -1412,7 +1412,7 @@
           <a:p>
             <a:fld id="{E4248CD4-4C32-45E7-9F40-9E5F0D1EAF13}" type="datetimeFigureOut">
               <a:rPr lang="it-IT" smtClean="0"/>
-              <a:t>30/09/2020</a:t>
+              <a:t>01/10/2020</a:t>
             </a:fld>
             <a:endParaRPr lang="it-IT"/>
           </a:p>
@@ -1824,7 +1824,7 @@
           <a:p>
             <a:fld id="{E4248CD4-4C32-45E7-9F40-9E5F0D1EAF13}" type="datetimeFigureOut">
               <a:rPr lang="it-IT" smtClean="0"/>
-              <a:t>30/09/2020</a:t>
+              <a:t>01/10/2020</a:t>
             </a:fld>
             <a:endParaRPr lang="it-IT"/>
           </a:p>
@@ -1965,7 +1965,7 @@
           <a:p>
             <a:fld id="{E4248CD4-4C32-45E7-9F40-9E5F0D1EAF13}" type="datetimeFigureOut">
               <a:rPr lang="it-IT" smtClean="0"/>
-              <a:t>30/09/2020</a:t>
+              <a:t>01/10/2020</a:t>
             </a:fld>
             <a:endParaRPr lang="it-IT"/>
           </a:p>
@@ -2078,7 +2078,7 @@
           <a:p>
             <a:fld id="{E4248CD4-4C32-45E7-9F40-9E5F0D1EAF13}" type="datetimeFigureOut">
               <a:rPr lang="it-IT" smtClean="0"/>
-              <a:t>30/09/2020</a:t>
+              <a:t>01/10/2020</a:t>
             </a:fld>
             <a:endParaRPr lang="it-IT"/>
           </a:p>
@@ -2389,7 +2389,7 @@
           <a:p>
             <a:fld id="{E4248CD4-4C32-45E7-9F40-9E5F0D1EAF13}" type="datetimeFigureOut">
               <a:rPr lang="it-IT" smtClean="0"/>
-              <a:t>30/09/2020</a:t>
+              <a:t>01/10/2020</a:t>
             </a:fld>
             <a:endParaRPr lang="it-IT"/>
           </a:p>
@@ -2677,7 +2677,7 @@
           <a:p>
             <a:fld id="{E4248CD4-4C32-45E7-9F40-9E5F0D1EAF13}" type="datetimeFigureOut">
               <a:rPr lang="it-IT" smtClean="0"/>
-              <a:t>30/09/2020</a:t>
+              <a:t>01/10/2020</a:t>
             </a:fld>
             <a:endParaRPr lang="it-IT"/>
           </a:p>
@@ -2918,7 +2918,7 @@
           <a:p>
             <a:fld id="{E4248CD4-4C32-45E7-9F40-9E5F0D1EAF13}" type="datetimeFigureOut">
               <a:rPr lang="it-IT" smtClean="0"/>
-              <a:t>30/09/2020</a:t>
+              <a:t>01/10/2020</a:t>
             </a:fld>
             <a:endParaRPr lang="it-IT"/>
           </a:p>
@@ -17347,8 +17347,8 @@
         </p:nvSpPr>
         <p:spPr>
           <a:xfrm>
-            <a:off x="3140891" y="5025888"/>
-            <a:ext cx="1021460" cy="738664"/>
+            <a:off x="3089006" y="5026880"/>
+            <a:ext cx="1140239" cy="738664"/>
           </a:xfrm>
           <a:prstGeom prst="rect">
             <a:avLst/>
@@ -17363,25 +17363,25 @@
           <a:p>
             <a:r>
               <a:rPr lang="it-IT" sz="1050" dirty="0"/>
-              <a:t>startTimer</a:t>
+              <a:t>startSubtimer</a:t>
             </a:r>
           </a:p>
           <a:p>
             <a:r>
               <a:rPr lang="it-IT" sz="1050" dirty="0"/>
-              <a:t>stopTimer</a:t>
+              <a:t>stopSubtimer</a:t>
             </a:r>
           </a:p>
           <a:p>
             <a:r>
               <a:rPr lang="it-IT" sz="1050" dirty="0"/>
-              <a:t>resumeTimer</a:t>
+              <a:t>resumeSubtimer</a:t>
             </a:r>
           </a:p>
           <a:p>
             <a:r>
               <a:rPr lang="it-IT" sz="1050" dirty="0"/>
-              <a:t>endTimer</a:t>
+              <a:t>endSubtimer</a:t>
             </a:r>
           </a:p>
         </p:txBody>
@@ -17442,8 +17442,8 @@
         </p:nvSpPr>
         <p:spPr>
           <a:xfrm>
-            <a:off x="3232388" y="5925010"/>
-            <a:ext cx="639919" cy="261610"/>
+            <a:off x="2956294" y="5925041"/>
+            <a:ext cx="1190647" cy="276999"/>
           </a:xfrm>
           <a:prstGeom prst="rect">
             <a:avLst/>
@@ -17460,7 +17460,10 @@
               <a:rPr lang="it-IT" sz="1050" dirty="0"/>
               <a:t>timeout</a:t>
             </a:r>
-            <a:endParaRPr lang="it-IT" sz="1200" dirty="0"/>
+            <a:r>
+              <a:rPr lang="it-IT" sz="1200" dirty="0"/>
+              <a:t>Subtimer</a:t>
+            </a:r>
           </a:p>
         </p:txBody>
       </p:sp>

</xml_diff>